<commit_message>
defense -- done, except need Chris's trigger plot
</commit_message>
<xml_diff>
--- a/defense/extras/defense - Copy.pptx
+++ b/defense/extras/defense - Copy.pptx
@@ -5,7 +5,7 @@
     <p:sldMasterId id="2147483648" r:id="rId1"/>
   </p:sldMasterIdLst>
   <p:notesMasterIdLst>
-    <p:notesMasterId r:id="rId15"/>
+    <p:notesMasterId r:id="rId16"/>
   </p:notesMasterIdLst>
   <p:sldIdLst>
     <p:sldId id="430" r:id="rId2"/>
@@ -21,6 +21,7 @@
     <p:sldId id="471" r:id="rId12"/>
     <p:sldId id="472" r:id="rId13"/>
     <p:sldId id="473" r:id="rId14"/>
+    <p:sldId id="474" r:id="rId15"/>
   </p:sldIdLst>
   <p:sldSz cx="9144000" cy="6858000" type="screen4x3"/>
   <p:notesSz cx="6858000" cy="9144000"/>
@@ -204,7 +205,7 @@
           <a:p>
             <a:fld id="{FA83269F-9E4F-414A-90A5-CFE999613A79}" type="datetimeFigureOut">
               <a:rPr lang="en-US" smtClean="0"/>
-              <a:t>12/3/2015</a:t>
+              <a:t>12/6/2015</a:t>
             </a:fld>
             <a:endParaRPr lang="en-US"/>
           </a:p>
@@ -653,7 +654,7 @@
           <a:p>
             <a:fld id="{ACFF21D2-48CC-41D3-9D1E-1764E36C135F}" type="datetime1">
               <a:rPr lang="en-US" smtClean="0"/>
-              <a:t>12/3/2015</a:t>
+              <a:t>12/6/2015</a:t>
             </a:fld>
             <a:endParaRPr lang="en-US"/>
           </a:p>
@@ -823,7 +824,7 @@
           <a:p>
             <a:fld id="{87673A7A-4F92-4E09-B5F3-8AD731F070F4}" type="datetime1">
               <a:rPr lang="en-US" smtClean="0"/>
-              <a:t>12/3/2015</a:t>
+              <a:t>12/6/2015</a:t>
             </a:fld>
             <a:endParaRPr lang="en-US"/>
           </a:p>
@@ -1003,7 +1004,7 @@
           <a:p>
             <a:fld id="{995D7E0D-47BB-4ECA-AFD5-8EE55B8EC179}" type="datetime1">
               <a:rPr lang="en-US" smtClean="0"/>
-              <a:t>12/3/2015</a:t>
+              <a:t>12/6/2015</a:t>
             </a:fld>
             <a:endParaRPr lang="en-US"/>
           </a:p>
@@ -1173,7 +1174,7 @@
           <a:p>
             <a:fld id="{85BBD160-6705-4B7A-9818-2D8C1D2FC2AB}" type="datetime1">
               <a:rPr lang="en-US" smtClean="0"/>
-              <a:t>12/3/2015</a:t>
+              <a:t>12/6/2015</a:t>
             </a:fld>
             <a:endParaRPr lang="en-US"/>
           </a:p>
@@ -1419,7 +1420,7 @@
           <a:p>
             <a:fld id="{7E0D55BA-7737-48E9-8A70-C1C434989387}" type="datetime1">
               <a:rPr lang="en-US" smtClean="0"/>
-              <a:t>12/3/2015</a:t>
+              <a:t>12/6/2015</a:t>
             </a:fld>
             <a:endParaRPr lang="en-US"/>
           </a:p>
@@ -1707,7 +1708,7 @@
           <a:p>
             <a:fld id="{A19B9D06-FDDA-49FF-B72F-A8EF2EBD9717}" type="datetime1">
               <a:rPr lang="en-US" smtClean="0"/>
-              <a:t>12/3/2015</a:t>
+              <a:t>12/6/2015</a:t>
             </a:fld>
             <a:endParaRPr lang="en-US"/>
           </a:p>
@@ -2129,7 +2130,7 @@
           <a:p>
             <a:fld id="{B0A2AB92-3B69-4743-83C2-937CF7AF1E07}" type="datetime1">
               <a:rPr lang="en-US" smtClean="0"/>
-              <a:t>12/3/2015</a:t>
+              <a:t>12/6/2015</a:t>
             </a:fld>
             <a:endParaRPr lang="en-US"/>
           </a:p>
@@ -2247,7 +2248,7 @@
           <a:p>
             <a:fld id="{E5D53092-27DC-4C60-92AC-B5BEBA5A3A5E}" type="datetime1">
               <a:rPr lang="en-US" smtClean="0"/>
-              <a:t>12/3/2015</a:t>
+              <a:t>12/6/2015</a:t>
             </a:fld>
             <a:endParaRPr lang="en-US"/>
           </a:p>
@@ -2342,7 +2343,7 @@
           <a:p>
             <a:fld id="{EE1123E5-586D-48AE-BAA2-6A5BFF3E96ED}" type="datetime1">
               <a:rPr lang="en-US" smtClean="0"/>
-              <a:t>12/3/2015</a:t>
+              <a:t>12/6/2015</a:t>
             </a:fld>
             <a:endParaRPr lang="en-US"/>
           </a:p>
@@ -2619,7 +2620,7 @@
           <a:p>
             <a:fld id="{96BAE30B-7B38-4932-8543-E7E50AC37C0E}" type="datetime1">
               <a:rPr lang="en-US" smtClean="0"/>
-              <a:t>12/3/2015</a:t>
+              <a:t>12/6/2015</a:t>
             </a:fld>
             <a:endParaRPr lang="en-US"/>
           </a:p>
@@ -2872,7 +2873,7 @@
           <a:p>
             <a:fld id="{EEEEADDF-664D-4870-81DD-E11505D166F1}" type="datetime1">
               <a:rPr lang="en-US" smtClean="0"/>
-              <a:t>12/3/2015</a:t>
+              <a:t>12/6/2015</a:t>
             </a:fld>
             <a:endParaRPr lang="en-US"/>
           </a:p>
@@ -3085,7 +3086,7 @@
           <a:p>
             <a:fld id="{91CB71C0-2AFE-431D-94A5-24479BE51119}" type="datetime1">
               <a:rPr lang="en-US" smtClean="0"/>
-              <a:t>12/3/2015</a:t>
+              <a:t>12/6/2015</a:t>
             </a:fld>
             <a:endParaRPr lang="en-US"/>
           </a:p>
@@ -5478,15 +5479,7 @@
                   <a:srgbClr val="0000CC"/>
                 </a:solidFill>
               </a:rPr>
-              <a:t>First </a:t>
-            </a:r>
-            <a:r>
-              <a:rPr lang="en-US" dirty="0" smtClean="0">
-                <a:solidFill>
-                  <a:srgbClr val="0000CC"/>
-                </a:solidFill>
-              </a:rPr>
-              <a:t>indications</a:t>
+              <a:t>First indications</a:t>
             </a:r>
             <a:r>
               <a:rPr lang="en-US" dirty="0">
@@ -5510,31 +5503,15 @@
                   <a:srgbClr val="0000CC"/>
                 </a:solidFill>
               </a:rPr>
-              <a:t>1930</a:t>
-            </a:r>
-            <a:r>
-              <a:rPr lang="en-US" dirty="0" smtClean="0">
+              <a:t>1930:</a:t>
+            </a:r>
+            <a:r>
+              <a:rPr lang="en-US" b="1" dirty="0" smtClean="0">
                 <a:solidFill>
                   <a:srgbClr val="0000CC"/>
                 </a:solidFill>
               </a:rPr>
-              <a:t>:</a:t>
-            </a:r>
-            <a:r>
-              <a:rPr lang="en-US" b="1" dirty="0" smtClean="0">
-                <a:solidFill>
-                  <a:srgbClr val="0000CC"/>
-                </a:solidFill>
-              </a:rPr>
-              <a:t>  </a:t>
-            </a:r>
-            <a:r>
-              <a:rPr lang="en-US" b="1" dirty="0" smtClean="0">
-                <a:solidFill>
-                  <a:srgbClr val="0000CC"/>
-                </a:solidFill>
-              </a:rPr>
-              <a:t>beta decay spectrum</a:t>
+              <a:t>  beta decay spectrum</a:t>
             </a:r>
             <a:endParaRPr lang="en-US" b="1" dirty="0">
               <a:solidFill>
@@ -6007,15 +5984,7 @@
                   <a:srgbClr val="0000CC"/>
                 </a:solidFill>
               </a:rPr>
-              <a:t>First </a:t>
-            </a:r>
-            <a:r>
-              <a:rPr lang="en-US" dirty="0" smtClean="0">
-                <a:solidFill>
-                  <a:srgbClr val="0000CC"/>
-                </a:solidFill>
-              </a:rPr>
-              <a:t>indications</a:t>
+              <a:t>First indications</a:t>
             </a:r>
             <a:r>
               <a:rPr lang="en-US" dirty="0">
@@ -6039,31 +6008,15 @@
                   <a:srgbClr val="0000CC"/>
                 </a:solidFill>
               </a:rPr>
-              <a:t>1930</a:t>
-            </a:r>
-            <a:r>
-              <a:rPr lang="en-US" dirty="0" smtClean="0">
+              <a:t>1930:</a:t>
+            </a:r>
+            <a:r>
+              <a:rPr lang="en-US" b="1" dirty="0" smtClean="0">
                 <a:solidFill>
                   <a:srgbClr val="0000CC"/>
                 </a:solidFill>
               </a:rPr>
-              <a:t>:</a:t>
-            </a:r>
-            <a:r>
-              <a:rPr lang="en-US" b="1" dirty="0" smtClean="0">
-                <a:solidFill>
-                  <a:srgbClr val="0000CC"/>
-                </a:solidFill>
-              </a:rPr>
-              <a:t>  </a:t>
-            </a:r>
-            <a:r>
-              <a:rPr lang="en-US" b="1" dirty="0" smtClean="0">
-                <a:solidFill>
-                  <a:srgbClr val="0000CC"/>
-                </a:solidFill>
-              </a:rPr>
-              <a:t>beta decay spectrum</a:t>
+              <a:t>  beta decay spectrum</a:t>
             </a:r>
             <a:endParaRPr lang="en-US" b="1" dirty="0">
               <a:solidFill>
@@ -6154,6 +6107,969 @@
     <p:extLst>
       <p:ext uri="{BB962C8B-B14F-4D97-AF65-F5344CB8AC3E}">
         <p14:creationId xmlns:p14="http://schemas.microsoft.com/office/powerpoint/2010/main" val="3811971028"/>
+      </p:ext>
+    </p:extLst>
+  </p:cSld>
+  <p:clrMapOvr>
+    <a:masterClrMapping/>
+  </p:clrMapOvr>
+  <p:timing>
+    <p:tnLst>
+      <p:par>
+        <p:cTn id="1" dur="indefinite" restart="never" nodeType="tmRoot"/>
+      </p:par>
+    </p:tnLst>
+  </p:timing>
+</p:sld>
+</file>
+
+<file path=ppt/slides/slide14.xml><?xml version="1.0" encoding="utf-8"?>
+<p:sld xmlns:a="http://schemas.openxmlformats.org/drawingml/2006/main" xmlns:r="http://schemas.openxmlformats.org/officeDocument/2006/relationships" xmlns:p="http://schemas.openxmlformats.org/presentationml/2006/main">
+  <p:cSld>
+    <p:spTree>
+      <p:nvGrpSpPr>
+        <p:cNvPr id="1" name=""/>
+        <p:cNvGrpSpPr/>
+        <p:nvPr/>
+      </p:nvGrpSpPr>
+      <p:grpSpPr>
+        <a:xfrm>
+          <a:off x="0" y="0"/>
+          <a:ext cx="0" cy="0"/>
+          <a:chOff x="0" y="0"/>
+          <a:chExt cx="0" cy="0"/>
+        </a:xfrm>
+      </p:grpSpPr>
+      <p:pic>
+        <p:nvPicPr>
+          <p:cNvPr id="7" name="Picture 6"/>
+          <p:cNvPicPr>
+            <a:picLocks noChangeAspect="1"/>
+          </p:cNvPicPr>
+          <p:nvPr/>
+        </p:nvPicPr>
+        <p:blipFill>
+          <a:blip r:embed="rId2" cstate="print">
+            <a:extLst>
+              <a:ext uri="{28A0092B-C50C-407E-A947-70E740481C1C}">
+                <a14:useLocalDpi xmlns:a14="http://schemas.microsoft.com/office/drawing/2010/main" val="0"/>
+              </a:ext>
+            </a:extLst>
+          </a:blip>
+          <a:stretch>
+            <a:fillRect/>
+          </a:stretch>
+        </p:blipFill>
+        <p:spPr>
+          <a:xfrm>
+            <a:off x="2156061" y="3708633"/>
+            <a:ext cx="2844561" cy="2768367"/>
+          </a:xfrm>
+          <a:prstGeom prst="rect">
+            <a:avLst/>
+          </a:prstGeom>
+        </p:spPr>
+      </p:pic>
+      <p:sp>
+        <p:nvSpPr>
+          <p:cNvPr id="33" name="Rectangle 32"/>
+          <p:cNvSpPr/>
+          <p:nvPr/>
+        </p:nvSpPr>
+        <p:spPr>
+          <a:xfrm>
+            <a:off x="4926706" y="3745123"/>
+            <a:ext cx="4131900" cy="3036677"/>
+          </a:xfrm>
+          <a:prstGeom prst="rect">
+            <a:avLst/>
+          </a:prstGeom>
+          <a:solidFill>
+            <a:schemeClr val="bg1">
+              <a:lumMod val="85000"/>
+            </a:schemeClr>
+          </a:solidFill>
+          <a:ln>
+            <a:noFill/>
+          </a:ln>
+        </p:spPr>
+        <p:style>
+          <a:lnRef idx="2">
+            <a:schemeClr val="accent1">
+              <a:shade val="50000"/>
+            </a:schemeClr>
+          </a:lnRef>
+          <a:fillRef idx="1">
+            <a:schemeClr val="accent1"/>
+          </a:fillRef>
+          <a:effectRef idx="0">
+            <a:schemeClr val="accent1"/>
+          </a:effectRef>
+          <a:fontRef idx="minor">
+            <a:schemeClr val="lt1"/>
+          </a:fontRef>
+        </p:style>
+        <p:txBody>
+          <a:bodyPr rtlCol="0" anchor="ctr"/>
+          <a:lstStyle/>
+          <a:p>
+            <a:pPr algn="ctr"/>
+            <a:endParaRPr lang="en-US"/>
+          </a:p>
+        </p:txBody>
+      </p:sp>
+      <p:sp>
+        <p:nvSpPr>
+          <p:cNvPr id="2" name="Slide Number Placeholder 1"/>
+          <p:cNvSpPr>
+            <a:spLocks noGrp="1"/>
+          </p:cNvSpPr>
+          <p:nvPr>
+            <p:ph type="sldNum" sz="quarter" idx="12"/>
+          </p:nvPr>
+        </p:nvSpPr>
+        <p:spPr/>
+        <p:txBody>
+          <a:bodyPr/>
+          <a:lstStyle/>
+          <a:p>
+            <a:fld id="{66B1EE22-C4C2-482C-B3A9-AFE3A9744799}" type="slidenum">
+              <a:rPr lang="en-US" smtClean="0"/>
+              <a:t>14</a:t>
+            </a:fld>
+            <a:endParaRPr lang="en-US"/>
+          </a:p>
+        </p:txBody>
+      </p:sp>
+      <p:sp>
+        <p:nvSpPr>
+          <p:cNvPr id="8" name="TextBox 7"/>
+          <p:cNvSpPr txBox="1"/>
+          <p:nvPr/>
+        </p:nvSpPr>
+        <p:spPr>
+          <a:xfrm>
+            <a:off x="2056043" y="49237"/>
+            <a:ext cx="5031570" cy="523220"/>
+          </a:xfrm>
+          <a:prstGeom prst="rect">
+            <a:avLst/>
+          </a:prstGeom>
+          <a:noFill/>
+        </p:spPr>
+        <p:txBody>
+          <a:bodyPr wrap="none" rtlCol="0">
+            <a:spAutoFit/>
+          </a:bodyPr>
+          <a:lstStyle/>
+          <a:p>
+            <a:pPr algn="ctr"/>
+            <a:r>
+              <a:rPr lang="en-US" sz="2800" dirty="0" smtClean="0">
+                <a:solidFill>
+                  <a:srgbClr val="0070C0"/>
+                </a:solidFill>
+              </a:rPr>
+              <a:t>First Attempts at Scanned Images</a:t>
+            </a:r>
+          </a:p>
+        </p:txBody>
+      </p:sp>
+      <p:sp>
+        <p:nvSpPr>
+          <p:cNvPr id="13" name="TextBox 12"/>
+          <p:cNvSpPr txBox="1"/>
+          <p:nvPr/>
+        </p:nvSpPr>
+        <p:spPr>
+          <a:xfrm>
+            <a:off x="0" y="4013433"/>
+            <a:ext cx="2339739" cy="1200329"/>
+          </a:xfrm>
+          <a:prstGeom prst="rect">
+            <a:avLst/>
+          </a:prstGeom>
+          <a:noFill/>
+        </p:spPr>
+        <p:txBody>
+          <a:bodyPr wrap="square" rtlCol="0">
+            <a:spAutoFit/>
+          </a:bodyPr>
+          <a:lstStyle/>
+          <a:p>
+            <a:r>
+              <a:rPr lang="en-US" dirty="0" smtClean="0">
+                <a:solidFill>
+                  <a:srgbClr val="C00000"/>
+                </a:solidFill>
+              </a:rPr>
+              <a:t>Step-to-step variation in surface BG competes w/ single-atom signal level:</a:t>
+            </a:r>
+            <a:endParaRPr lang="en-US" dirty="0">
+              <a:solidFill>
+                <a:srgbClr val="C00000"/>
+              </a:solidFill>
+            </a:endParaRPr>
+          </a:p>
+        </p:txBody>
+      </p:sp>
+      <p:grpSp>
+        <p:nvGrpSpPr>
+          <p:cNvPr id="23" name="Group 22"/>
+          <p:cNvGrpSpPr/>
+          <p:nvPr/>
+        </p:nvGrpSpPr>
+        <p:grpSpPr>
+          <a:xfrm>
+            <a:off x="0" y="550923"/>
+            <a:ext cx="9144000" cy="2157657"/>
+            <a:chOff x="0" y="550923"/>
+            <a:chExt cx="9144000" cy="2157657"/>
+          </a:xfrm>
+        </p:grpSpPr>
+        <p:grpSp>
+          <p:nvGrpSpPr>
+            <p:cNvPr id="18" name="Group 17"/>
+            <p:cNvGrpSpPr/>
+            <p:nvPr/>
+          </p:nvGrpSpPr>
+          <p:grpSpPr>
+            <a:xfrm>
+              <a:off x="0" y="609600"/>
+              <a:ext cx="9144000" cy="2098980"/>
+              <a:chOff x="0" y="609600"/>
+              <a:chExt cx="9144000" cy="2098980"/>
+            </a:xfrm>
+          </p:grpSpPr>
+          <p:pic>
+            <p:nvPicPr>
+              <p:cNvPr id="9" name="Picture 8"/>
+              <p:cNvPicPr>
+                <a:picLocks noChangeAspect="1"/>
+              </p:cNvPicPr>
+              <p:nvPr/>
+            </p:nvPicPr>
+            <p:blipFill>
+              <a:blip r:embed="rId3" cstate="print">
+                <a:extLst>
+                  <a:ext uri="{28A0092B-C50C-407E-A947-70E740481C1C}">
+                    <a14:useLocalDpi xmlns:a14="http://schemas.microsoft.com/office/drawing/2010/main" val="0"/>
+                  </a:ext>
+                </a:extLst>
+              </a:blip>
+              <a:stretch>
+                <a:fillRect/>
+              </a:stretch>
+            </p:blipFill>
+            <p:spPr>
+              <a:xfrm>
+                <a:off x="0" y="609600"/>
+                <a:ext cx="2156061" cy="2098309"/>
+              </a:xfrm>
+              <a:prstGeom prst="rect">
+                <a:avLst/>
+              </a:prstGeom>
+            </p:spPr>
+          </p:pic>
+          <p:pic>
+            <p:nvPicPr>
+              <p:cNvPr id="10" name="Picture 9"/>
+              <p:cNvPicPr>
+                <a:picLocks noChangeAspect="1"/>
+              </p:cNvPicPr>
+              <p:nvPr/>
+            </p:nvPicPr>
+            <p:blipFill>
+              <a:blip r:embed="rId4" cstate="print">
+                <a:extLst>
+                  <a:ext uri="{28A0092B-C50C-407E-A947-70E740481C1C}">
+                    <a14:useLocalDpi xmlns:a14="http://schemas.microsoft.com/office/drawing/2010/main" val="0"/>
+                  </a:ext>
+                </a:extLst>
+              </a:blip>
+              <a:stretch>
+                <a:fillRect/>
+              </a:stretch>
+            </p:blipFill>
+            <p:spPr>
+              <a:xfrm>
+                <a:off x="2339739" y="609600"/>
+                <a:ext cx="2156061" cy="2098309"/>
+              </a:xfrm>
+              <a:prstGeom prst="rect">
+                <a:avLst/>
+              </a:prstGeom>
+            </p:spPr>
+          </p:pic>
+          <p:pic>
+            <p:nvPicPr>
+              <p:cNvPr id="11" name="Picture 10"/>
+              <p:cNvPicPr>
+                <a:picLocks noChangeAspect="1"/>
+              </p:cNvPicPr>
+              <p:nvPr/>
+            </p:nvPicPr>
+            <p:blipFill>
+              <a:blip r:embed="rId5" cstate="print">
+                <a:extLst>
+                  <a:ext uri="{28A0092B-C50C-407E-A947-70E740481C1C}">
+                    <a14:useLocalDpi xmlns:a14="http://schemas.microsoft.com/office/drawing/2010/main" val="0"/>
+                  </a:ext>
+                </a:extLst>
+              </a:blip>
+              <a:stretch>
+                <a:fillRect/>
+              </a:stretch>
+            </p:blipFill>
+            <p:spPr>
+              <a:xfrm>
+                <a:off x="4648200" y="610271"/>
+                <a:ext cx="2156061" cy="2098309"/>
+              </a:xfrm>
+              <a:prstGeom prst="rect">
+                <a:avLst/>
+              </a:prstGeom>
+            </p:spPr>
+          </p:pic>
+          <p:pic>
+            <p:nvPicPr>
+              <p:cNvPr id="12" name="Picture 11"/>
+              <p:cNvPicPr>
+                <a:picLocks noChangeAspect="1"/>
+              </p:cNvPicPr>
+              <p:nvPr/>
+            </p:nvPicPr>
+            <p:blipFill>
+              <a:blip r:embed="rId6" cstate="print">
+                <a:extLst>
+                  <a:ext uri="{28A0092B-C50C-407E-A947-70E740481C1C}">
+                    <a14:useLocalDpi xmlns:a14="http://schemas.microsoft.com/office/drawing/2010/main" val="0"/>
+                  </a:ext>
+                </a:extLst>
+              </a:blip>
+              <a:stretch>
+                <a:fillRect/>
+              </a:stretch>
+            </p:blipFill>
+            <p:spPr>
+              <a:xfrm>
+                <a:off x="6987939" y="609600"/>
+                <a:ext cx="2156061" cy="2098309"/>
+              </a:xfrm>
+              <a:prstGeom prst="rect">
+                <a:avLst/>
+              </a:prstGeom>
+            </p:spPr>
+          </p:pic>
+          <p:sp>
+            <p:nvSpPr>
+              <p:cNvPr id="14" name="Rectangle 13"/>
+              <p:cNvSpPr/>
+              <p:nvPr/>
+            </p:nvSpPr>
+            <p:spPr>
+              <a:xfrm>
+                <a:off x="152400" y="685800"/>
+                <a:ext cx="304800" cy="381000"/>
+              </a:xfrm>
+              <a:prstGeom prst="rect">
+                <a:avLst/>
+              </a:prstGeom>
+              <a:solidFill>
+                <a:schemeClr val="bg1"/>
+              </a:solidFill>
+              <a:ln>
+                <a:noFill/>
+              </a:ln>
+            </p:spPr>
+            <p:style>
+              <a:lnRef idx="2">
+                <a:schemeClr val="accent1">
+                  <a:shade val="50000"/>
+                </a:schemeClr>
+              </a:lnRef>
+              <a:fillRef idx="1">
+                <a:schemeClr val="accent1"/>
+              </a:fillRef>
+              <a:effectRef idx="0">
+                <a:schemeClr val="accent1"/>
+              </a:effectRef>
+              <a:fontRef idx="minor">
+                <a:schemeClr val="lt1"/>
+              </a:fontRef>
+            </p:style>
+            <p:txBody>
+              <a:bodyPr rtlCol="0" anchor="ctr"/>
+              <a:lstStyle/>
+              <a:p>
+                <a:pPr algn="ctr"/>
+                <a:endParaRPr lang="en-US"/>
+              </a:p>
+            </p:txBody>
+          </p:sp>
+          <p:sp>
+            <p:nvSpPr>
+              <p:cNvPr id="15" name="Rectangle 14"/>
+              <p:cNvSpPr/>
+              <p:nvPr/>
+            </p:nvSpPr>
+            <p:spPr>
+              <a:xfrm>
+                <a:off x="2514600" y="685800"/>
+                <a:ext cx="228600" cy="381000"/>
+              </a:xfrm>
+              <a:prstGeom prst="rect">
+                <a:avLst/>
+              </a:prstGeom>
+              <a:solidFill>
+                <a:schemeClr val="bg1"/>
+              </a:solidFill>
+              <a:ln>
+                <a:noFill/>
+              </a:ln>
+            </p:spPr>
+            <p:style>
+              <a:lnRef idx="2">
+                <a:schemeClr val="accent1">
+                  <a:shade val="50000"/>
+                </a:schemeClr>
+              </a:lnRef>
+              <a:fillRef idx="1">
+                <a:schemeClr val="accent1"/>
+              </a:fillRef>
+              <a:effectRef idx="0">
+                <a:schemeClr val="accent1"/>
+              </a:effectRef>
+              <a:fontRef idx="minor">
+                <a:schemeClr val="lt1"/>
+              </a:fontRef>
+            </p:style>
+            <p:txBody>
+              <a:bodyPr rtlCol="0" anchor="ctr"/>
+              <a:lstStyle/>
+              <a:p>
+                <a:pPr algn="ctr"/>
+                <a:endParaRPr lang="en-US"/>
+              </a:p>
+            </p:txBody>
+          </p:sp>
+          <p:sp>
+            <p:nvSpPr>
+              <p:cNvPr id="16" name="Rectangle 15"/>
+              <p:cNvSpPr/>
+              <p:nvPr/>
+            </p:nvSpPr>
+            <p:spPr>
+              <a:xfrm>
+                <a:off x="4800600" y="685800"/>
+                <a:ext cx="228600" cy="381000"/>
+              </a:xfrm>
+              <a:prstGeom prst="rect">
+                <a:avLst/>
+              </a:prstGeom>
+              <a:solidFill>
+                <a:schemeClr val="bg1"/>
+              </a:solidFill>
+              <a:ln>
+                <a:noFill/>
+              </a:ln>
+            </p:spPr>
+            <p:style>
+              <a:lnRef idx="2">
+                <a:schemeClr val="accent1">
+                  <a:shade val="50000"/>
+                </a:schemeClr>
+              </a:lnRef>
+              <a:fillRef idx="1">
+                <a:schemeClr val="accent1"/>
+              </a:fillRef>
+              <a:effectRef idx="0">
+                <a:schemeClr val="accent1"/>
+              </a:effectRef>
+              <a:fontRef idx="minor">
+                <a:schemeClr val="lt1"/>
+              </a:fontRef>
+            </p:style>
+            <p:txBody>
+              <a:bodyPr rtlCol="0" anchor="ctr"/>
+              <a:lstStyle/>
+              <a:p>
+                <a:pPr algn="ctr"/>
+                <a:endParaRPr lang="en-US"/>
+              </a:p>
+            </p:txBody>
+          </p:sp>
+          <p:sp>
+            <p:nvSpPr>
+              <p:cNvPr id="17" name="Rectangle 16"/>
+              <p:cNvSpPr/>
+              <p:nvPr/>
+            </p:nvSpPr>
+            <p:spPr>
+              <a:xfrm>
+                <a:off x="7239000" y="774342"/>
+                <a:ext cx="228600" cy="381000"/>
+              </a:xfrm>
+              <a:prstGeom prst="rect">
+                <a:avLst/>
+              </a:prstGeom>
+              <a:solidFill>
+                <a:schemeClr val="bg1"/>
+              </a:solidFill>
+              <a:ln>
+                <a:noFill/>
+              </a:ln>
+            </p:spPr>
+            <p:style>
+              <a:lnRef idx="2">
+                <a:schemeClr val="accent1">
+                  <a:shade val="50000"/>
+                </a:schemeClr>
+              </a:lnRef>
+              <a:fillRef idx="1">
+                <a:schemeClr val="accent1"/>
+              </a:fillRef>
+              <a:effectRef idx="0">
+                <a:schemeClr val="accent1"/>
+              </a:effectRef>
+              <a:fontRef idx="minor">
+                <a:schemeClr val="lt1"/>
+              </a:fontRef>
+            </p:style>
+            <p:txBody>
+              <a:bodyPr rtlCol="0" anchor="ctr"/>
+              <a:lstStyle/>
+              <a:p>
+                <a:pPr algn="ctr"/>
+                <a:endParaRPr lang="en-US"/>
+              </a:p>
+            </p:txBody>
+          </p:sp>
+        </p:grpSp>
+        <p:sp>
+          <p:nvSpPr>
+            <p:cNvPr id="19" name="TextBox 18"/>
+            <p:cNvSpPr txBox="1"/>
+            <p:nvPr/>
+          </p:nvSpPr>
+          <p:spPr>
+            <a:xfrm>
+              <a:off x="218077" y="572457"/>
+              <a:ext cx="1534523" cy="369332"/>
+            </a:xfrm>
+            <a:prstGeom prst="rect">
+              <a:avLst/>
+            </a:prstGeom>
+            <a:noFill/>
+          </p:spPr>
+          <p:txBody>
+            <a:bodyPr wrap="none" rtlCol="0">
+              <a:spAutoFit/>
+            </a:bodyPr>
+            <a:lstStyle/>
+            <a:p>
+              <a:r>
+                <a:rPr lang="en-US" dirty="0" smtClean="0">
+                  <a:solidFill>
+                    <a:srgbClr val="FF0000"/>
+                  </a:solidFill>
+                </a:rPr>
+                <a:t>≤ 0.48 Ba/step</a:t>
+              </a:r>
+              <a:endParaRPr lang="en-US" dirty="0">
+                <a:solidFill>
+                  <a:srgbClr val="FF0000"/>
+                </a:solidFill>
+              </a:endParaRPr>
+            </a:p>
+          </p:txBody>
+        </p:sp>
+        <p:sp>
+          <p:nvSpPr>
+            <p:cNvPr id="20" name="TextBox 19"/>
+            <p:cNvSpPr txBox="1"/>
+            <p:nvPr/>
+          </p:nvSpPr>
+          <p:spPr>
+            <a:xfrm>
+              <a:off x="4914900" y="550923"/>
+              <a:ext cx="1534523" cy="369332"/>
+            </a:xfrm>
+            <a:prstGeom prst="rect">
+              <a:avLst/>
+            </a:prstGeom>
+            <a:noFill/>
+          </p:spPr>
+          <p:txBody>
+            <a:bodyPr wrap="none" rtlCol="0">
+              <a:spAutoFit/>
+            </a:bodyPr>
+            <a:lstStyle/>
+            <a:p>
+              <a:r>
+                <a:rPr lang="en-US" dirty="0" smtClean="0">
+                  <a:solidFill>
+                    <a:srgbClr val="FF0000"/>
+                  </a:solidFill>
+                </a:rPr>
+                <a:t>≤ 0.63 Ba/step</a:t>
+              </a:r>
+              <a:endParaRPr lang="en-US" dirty="0">
+                <a:solidFill>
+                  <a:srgbClr val="FF0000"/>
+                </a:solidFill>
+              </a:endParaRPr>
+            </a:p>
+          </p:txBody>
+        </p:sp>
+        <p:sp>
+          <p:nvSpPr>
+            <p:cNvPr id="21" name="TextBox 20"/>
+            <p:cNvSpPr txBox="1"/>
+            <p:nvPr/>
+          </p:nvSpPr>
+          <p:spPr>
+            <a:xfrm>
+              <a:off x="7247586" y="550923"/>
+              <a:ext cx="1417504" cy="369332"/>
+            </a:xfrm>
+            <a:prstGeom prst="rect">
+              <a:avLst/>
+            </a:prstGeom>
+            <a:noFill/>
+          </p:spPr>
+          <p:txBody>
+            <a:bodyPr wrap="none" rtlCol="0">
+              <a:spAutoFit/>
+            </a:bodyPr>
+            <a:lstStyle/>
+            <a:p>
+              <a:r>
+                <a:rPr lang="en-US" dirty="0" smtClean="0">
+                  <a:solidFill>
+                    <a:srgbClr val="FF0000"/>
+                  </a:solidFill>
+                </a:rPr>
+                <a:t>≤ 5.7 Ba/step</a:t>
+              </a:r>
+              <a:endParaRPr lang="en-US" dirty="0">
+                <a:solidFill>
+                  <a:srgbClr val="FF0000"/>
+                </a:solidFill>
+              </a:endParaRPr>
+            </a:p>
+          </p:txBody>
+        </p:sp>
+        <p:sp>
+          <p:nvSpPr>
+            <p:cNvPr id="22" name="TextBox 21"/>
+            <p:cNvSpPr txBox="1"/>
+            <p:nvPr/>
+          </p:nvSpPr>
+          <p:spPr>
+            <a:xfrm>
+              <a:off x="2743200" y="572457"/>
+              <a:ext cx="887166" cy="369332"/>
+            </a:xfrm>
+            <a:prstGeom prst="rect">
+              <a:avLst/>
+            </a:prstGeom>
+            <a:noFill/>
+          </p:spPr>
+          <p:txBody>
+            <a:bodyPr wrap="none" rtlCol="0">
+              <a:spAutoFit/>
+            </a:bodyPr>
+            <a:lstStyle/>
+            <a:p>
+              <a:r>
+                <a:rPr lang="en-US" dirty="0" smtClean="0">
+                  <a:solidFill>
+                    <a:srgbClr val="0000CC"/>
+                  </a:solidFill>
+                </a:rPr>
+                <a:t>Xe-only</a:t>
+              </a:r>
+              <a:endParaRPr lang="en-US" dirty="0">
+                <a:solidFill>
+                  <a:srgbClr val="0000CC"/>
+                </a:solidFill>
+              </a:endParaRPr>
+            </a:p>
+          </p:txBody>
+        </p:sp>
+      </p:grpSp>
+      <p:sp>
+        <p:nvSpPr>
+          <p:cNvPr id="25" name="TextBox 24"/>
+          <p:cNvSpPr txBox="1"/>
+          <p:nvPr/>
+        </p:nvSpPr>
+        <p:spPr>
+          <a:xfrm>
+            <a:off x="2073625" y="3047931"/>
+            <a:ext cx="3113481" cy="369332"/>
+          </a:xfrm>
+          <a:prstGeom prst="rect">
+            <a:avLst/>
+          </a:prstGeom>
+          <a:noFill/>
+        </p:spPr>
+        <p:txBody>
+          <a:bodyPr wrap="none" rtlCol="0">
+            <a:spAutoFit/>
+          </a:bodyPr>
+          <a:lstStyle/>
+          <a:p>
+            <a:r>
+              <a:rPr lang="en-US" dirty="0" smtClean="0"/>
+              <a:t>Trend-line single-Ba signal level</a:t>
+            </a:r>
+            <a:endParaRPr lang="en-US" dirty="0"/>
+          </a:p>
+        </p:txBody>
+      </p:sp>
+      <p:cxnSp>
+        <p:nvCxnSpPr>
+          <p:cNvPr id="27" name="Straight Arrow Connector 26"/>
+          <p:cNvCxnSpPr/>
+          <p:nvPr/>
+        </p:nvCxnSpPr>
+        <p:spPr>
+          <a:xfrm>
+            <a:off x="3810000" y="3417263"/>
+            <a:ext cx="0" cy="392737"/>
+          </a:xfrm>
+          <a:prstGeom prst="straightConnector1">
+            <a:avLst/>
+          </a:prstGeom>
+          <a:ln w="38100">
+            <a:solidFill>
+              <a:schemeClr val="tx1">
+                <a:lumMod val="50000"/>
+                <a:lumOff val="50000"/>
+              </a:schemeClr>
+            </a:solidFill>
+            <a:tailEnd type="arrow"/>
+          </a:ln>
+        </p:spPr>
+        <p:style>
+          <a:lnRef idx="1">
+            <a:schemeClr val="accent1"/>
+          </a:lnRef>
+          <a:fillRef idx="0">
+            <a:schemeClr val="accent1"/>
+          </a:fillRef>
+          <a:effectRef idx="0">
+            <a:schemeClr val="accent1"/>
+          </a:effectRef>
+          <a:fontRef idx="minor">
+            <a:schemeClr val="tx1"/>
+          </a:fontRef>
+        </p:style>
+      </p:cxnSp>
+      <p:sp>
+        <p:nvSpPr>
+          <p:cNvPr id="28" name="TextBox 27"/>
+          <p:cNvSpPr txBox="1"/>
+          <p:nvPr/>
+        </p:nvSpPr>
+        <p:spPr>
+          <a:xfrm>
+            <a:off x="3930487" y="3276600"/>
+            <a:ext cx="1632113" cy="369332"/>
+          </a:xfrm>
+          <a:prstGeom prst="rect">
+            <a:avLst/>
+          </a:prstGeom>
+          <a:noFill/>
+        </p:spPr>
+        <p:txBody>
+          <a:bodyPr wrap="none" rtlCol="0">
+            <a:spAutoFit/>
+          </a:bodyPr>
+          <a:lstStyle/>
+          <a:p>
+            <a:r>
+              <a:rPr lang="en-US" dirty="0" smtClean="0"/>
+              <a:t>(10-s exposure)</a:t>
+            </a:r>
+            <a:endParaRPr lang="en-US" dirty="0"/>
+          </a:p>
+        </p:txBody>
+      </p:sp>
+      <p:sp>
+        <p:nvSpPr>
+          <p:cNvPr id="29" name="TextBox 28"/>
+          <p:cNvSpPr txBox="1"/>
+          <p:nvPr/>
+        </p:nvSpPr>
+        <p:spPr>
+          <a:xfrm>
+            <a:off x="4926706" y="3745123"/>
+            <a:ext cx="4131900" cy="1200329"/>
+          </a:xfrm>
+          <a:prstGeom prst="rect">
+            <a:avLst/>
+          </a:prstGeom>
+          <a:noFill/>
+        </p:spPr>
+        <p:txBody>
+          <a:bodyPr wrap="none" rtlCol="0">
+            <a:spAutoFit/>
+          </a:bodyPr>
+          <a:lstStyle/>
+          <a:p>
+            <a:r>
+              <a:rPr lang="en-US" b="1" dirty="0" smtClean="0"/>
+              <a:t>Need to reduce surface background:</a:t>
+            </a:r>
+          </a:p>
+          <a:p>
+            <a:pPr marL="342900" indent="-342900">
+              <a:buAutoNum type="arabicParenR"/>
+            </a:pPr>
+            <a:r>
+              <a:rPr lang="en-US" dirty="0" smtClean="0"/>
+              <a:t>Separation by fluorescence lifetimes</a:t>
+            </a:r>
+          </a:p>
+          <a:p>
+            <a:pPr marL="342900" indent="-342900">
+              <a:buAutoNum type="arabicParenR"/>
+            </a:pPr>
+            <a:r>
+              <a:rPr lang="en-US" dirty="0" smtClean="0"/>
+              <a:t>Acid etching</a:t>
+            </a:r>
+          </a:p>
+          <a:p>
+            <a:pPr marL="342900" indent="-342900">
+              <a:buAutoNum type="arabicParenR"/>
+            </a:pPr>
+            <a:r>
+              <a:rPr lang="en-US" dirty="0" smtClean="0"/>
+              <a:t>Synchronize laser gating w/ vibrations:</a:t>
+            </a:r>
+            <a:endParaRPr lang="en-US" dirty="0"/>
+          </a:p>
+        </p:txBody>
+      </p:sp>
+      <p:pic>
+        <p:nvPicPr>
+          <p:cNvPr id="31" name="Picture 30"/>
+          <p:cNvPicPr>
+            <a:picLocks noChangeAspect="1"/>
+          </p:cNvPicPr>
+          <p:nvPr/>
+        </p:nvPicPr>
+        <p:blipFill rotWithShape="1">
+          <a:blip r:embed="rId7" cstate="print">
+            <a:extLst>
+              <a:ext uri="{28A0092B-C50C-407E-A947-70E740481C1C}">
+                <a14:useLocalDpi xmlns:a14="http://schemas.microsoft.com/office/drawing/2010/main" val="0"/>
+              </a:ext>
+            </a:extLst>
+          </a:blip>
+          <a:srcRect l="5208" b="7379"/>
+          <a:stretch/>
+        </p:blipFill>
+        <p:spPr>
+          <a:xfrm>
+            <a:off x="5643038" y="4964434"/>
+            <a:ext cx="2586562" cy="1671622"/>
+          </a:xfrm>
+          <a:prstGeom prst="rect">
+            <a:avLst/>
+          </a:prstGeom>
+          <a:ln w="15875">
+            <a:solidFill>
+              <a:schemeClr val="tx1"/>
+            </a:solidFill>
+          </a:ln>
+        </p:spPr>
+      </p:pic>
+      <p:sp>
+        <p:nvSpPr>
+          <p:cNvPr id="30" name="Oval 29"/>
+          <p:cNvSpPr/>
+          <p:nvPr/>
+        </p:nvSpPr>
+        <p:spPr>
+          <a:xfrm rot="618575">
+            <a:off x="7221898" y="5558845"/>
+            <a:ext cx="876300" cy="739487"/>
+          </a:xfrm>
+          <a:prstGeom prst="ellipse">
+            <a:avLst/>
+          </a:prstGeom>
+          <a:noFill/>
+          <a:ln>
+            <a:solidFill>
+              <a:schemeClr val="tx1"/>
+            </a:solidFill>
+            <a:prstDash val="sysDash"/>
+          </a:ln>
+        </p:spPr>
+        <p:style>
+          <a:lnRef idx="2">
+            <a:schemeClr val="accent1">
+              <a:shade val="50000"/>
+            </a:schemeClr>
+          </a:lnRef>
+          <a:fillRef idx="1">
+            <a:schemeClr val="accent1"/>
+          </a:fillRef>
+          <a:effectRef idx="0">
+            <a:schemeClr val="accent1"/>
+          </a:effectRef>
+          <a:fontRef idx="minor">
+            <a:schemeClr val="lt1"/>
+          </a:fontRef>
+        </p:style>
+        <p:txBody>
+          <a:bodyPr rtlCol="0" anchor="ctr"/>
+          <a:lstStyle/>
+          <a:p>
+            <a:pPr algn="ctr"/>
+            <a:endParaRPr lang="en-US"/>
+          </a:p>
+        </p:txBody>
+      </p:sp>
+      <p:sp>
+        <p:nvSpPr>
+          <p:cNvPr id="32" name="TextBox 31"/>
+          <p:cNvSpPr txBox="1"/>
+          <p:nvPr/>
+        </p:nvSpPr>
+        <p:spPr>
+          <a:xfrm>
+            <a:off x="6096000" y="5029200"/>
+            <a:ext cx="567784" cy="1015663"/>
+          </a:xfrm>
+          <a:prstGeom prst="rect">
+            <a:avLst/>
+          </a:prstGeom>
+          <a:noFill/>
+        </p:spPr>
+        <p:txBody>
+          <a:bodyPr wrap="none" rtlCol="0">
+            <a:spAutoFit/>
+          </a:bodyPr>
+          <a:lstStyle/>
+          <a:p>
+            <a:r>
+              <a:rPr lang="en-US" sz="6000" dirty="0" smtClean="0"/>
+              <a:t>×</a:t>
+            </a:r>
+            <a:endParaRPr lang="en-US" sz="6000" dirty="0"/>
+          </a:p>
+        </p:txBody>
+      </p:sp>
+    </p:spTree>
+    <p:extLst>
+      <p:ext uri="{BB962C8B-B14F-4D97-AF65-F5344CB8AC3E}">
+        <p14:creationId xmlns:p14="http://schemas.microsoft.com/office/powerpoint/2010/main" val="3219695291"/>
       </p:ext>
     </p:extLst>
   </p:cSld>

</xml_diff>